<commit_message>
Modified WebScrapeProcedure in docs/
</commit_message>
<xml_diff>
--- a/docs/WebScrapeProcedure.pptx
+++ b/docs/WebScrapeProcedure.pptx
@@ -3693,8 +3693,8 @@
         </p:nvSpPr>
         <p:spPr>
           <a:xfrm>
-            <a:off x="4416973" y="4721229"/>
-            <a:ext cx="4682511" cy="1846659"/>
+            <a:off x="3484804" y="4430714"/>
+            <a:ext cx="5659196" cy="2400657"/>
           </a:xfrm>
           <a:prstGeom prst="rect">
             <a:avLst/>
@@ -3769,7 +3769,42 @@
             </a:r>
             <a:r>
               <a:rPr lang="en-US" sz="1200" dirty="0" smtClean="0"/>
-              <a:t> database? Do we really want/need it?</a:t>
+              <a:t> database? Do we really want/need it</a:t>
+            </a:r>
+            <a:r>
+              <a:rPr lang="en-US" sz="1200" dirty="0" smtClean="0"/>
+              <a:t>? </a:t>
+            </a:r>
+            <a:br>
+              <a:rPr lang="en-US" sz="1200" dirty="0" smtClean="0"/>
+            </a:br>
+            <a:r>
+              <a:rPr lang="en-US" sz="1200" dirty="0" smtClean="0"/>
+              <a:t>Perhaps, if we are going to attempt to select data using complex conditions (e.g. – I want all players between the years of X an Y, who scored Z points against west coast teams.). If we do want an </a:t>
+            </a:r>
+            <a:r>
+              <a:rPr lang="en-US" sz="1200" dirty="0" err="1" smtClean="0"/>
+              <a:t>sql</a:t>
+            </a:r>
+            <a:r>
+              <a:rPr lang="en-US" sz="1200" dirty="0" smtClean="0"/>
+              <a:t> database. We should create a function in </a:t>
+            </a:r>
+            <a:r>
+              <a:rPr lang="en-US" sz="1200" dirty="0" err="1" smtClean="0"/>
+              <a:t>scrape_core.py</a:t>
+            </a:r>
+            <a:r>
+              <a:rPr lang="en-US" sz="1200" dirty="0" smtClean="0"/>
+              <a:t> to create an </a:t>
+            </a:r>
+            <a:r>
+              <a:rPr lang="en-US" sz="1200" dirty="0" err="1" smtClean="0"/>
+              <a:t>sql</a:t>
+            </a:r>
+            <a:r>
+              <a:rPr lang="en-US" sz="1200" dirty="0" smtClean="0"/>
+              <a:t> database each time we scrape new data.</a:t>
             </a:r>
             <a:endParaRPr lang="en-US" sz="1200" dirty="0"/>
           </a:p>

</xml_diff>